<commit_message>
docs: new ver on pdfs and folders
</commit_message>
<xml_diff>
--- a/assets/Slides (2024)/pptx/6-diff-tdd-bdd.pptx
+++ b/assets/Slides (2024)/pptx/6-diff-tdd-bdd.pptx
@@ -113,6 +113,11 @@
       </a:defRPr>
     </a:lvl9pPr>
   </p:defaultTextStyle>
+  <p:extLst>
+    <p:ext uri="{EFAFB233-063F-42B5-8137-9DF3F51BA10A}">
+      <p15:sldGuideLst xmlns:p15="http://schemas.microsoft.com/office/powerpoint/2012/main"/>
+    </p:ext>
+  </p:extLst>
 </p:presentation>
 </file>
 
@@ -247,7 +252,7 @@
           <a:p>
             <a:fld id="{076813AA-E60F-46CB-AF35-4E9FD021AE48}" type="datetimeFigureOut">
               <a:rPr lang="en-SE" smtClean="0"/>
-              <a:t>2024-10-26</a:t>
+              <a:t>2024-10-27</a:t>
             </a:fld>
             <a:endParaRPr lang="en-SE"/>
           </a:p>
@@ -417,7 +422,7 @@
           <a:p>
             <a:fld id="{076813AA-E60F-46CB-AF35-4E9FD021AE48}" type="datetimeFigureOut">
               <a:rPr lang="en-SE" smtClean="0"/>
-              <a:t>2024-10-26</a:t>
+              <a:t>2024-10-27</a:t>
             </a:fld>
             <a:endParaRPr lang="en-SE"/>
           </a:p>
@@ -597,7 +602,7 @@
           <a:p>
             <a:fld id="{076813AA-E60F-46CB-AF35-4E9FD021AE48}" type="datetimeFigureOut">
               <a:rPr lang="en-SE" smtClean="0"/>
-              <a:t>2024-10-26</a:t>
+              <a:t>2024-10-27</a:t>
             </a:fld>
             <a:endParaRPr lang="en-SE"/>
           </a:p>
@@ -767,7 +772,7 @@
           <a:p>
             <a:fld id="{076813AA-E60F-46CB-AF35-4E9FD021AE48}" type="datetimeFigureOut">
               <a:rPr lang="en-SE" smtClean="0"/>
-              <a:t>2024-10-26</a:t>
+              <a:t>2024-10-27</a:t>
             </a:fld>
             <a:endParaRPr lang="en-SE"/>
           </a:p>
@@ -1013,7 +1018,7 @@
           <a:p>
             <a:fld id="{076813AA-E60F-46CB-AF35-4E9FD021AE48}" type="datetimeFigureOut">
               <a:rPr lang="en-SE" smtClean="0"/>
-              <a:t>2024-10-26</a:t>
+              <a:t>2024-10-27</a:t>
             </a:fld>
             <a:endParaRPr lang="en-SE"/>
           </a:p>
@@ -1245,7 +1250,7 @@
           <a:p>
             <a:fld id="{076813AA-E60F-46CB-AF35-4E9FD021AE48}" type="datetimeFigureOut">
               <a:rPr lang="en-SE" smtClean="0"/>
-              <a:t>2024-10-26</a:t>
+              <a:t>2024-10-27</a:t>
             </a:fld>
             <a:endParaRPr lang="en-SE"/>
           </a:p>
@@ -1612,7 +1617,7 @@
           <a:p>
             <a:fld id="{076813AA-E60F-46CB-AF35-4E9FD021AE48}" type="datetimeFigureOut">
               <a:rPr lang="en-SE" smtClean="0"/>
-              <a:t>2024-10-26</a:t>
+              <a:t>2024-10-27</a:t>
             </a:fld>
             <a:endParaRPr lang="en-SE"/>
           </a:p>
@@ -1730,7 +1735,7 @@
           <a:p>
             <a:fld id="{076813AA-E60F-46CB-AF35-4E9FD021AE48}" type="datetimeFigureOut">
               <a:rPr lang="en-SE" smtClean="0"/>
-              <a:t>2024-10-26</a:t>
+              <a:t>2024-10-27</a:t>
             </a:fld>
             <a:endParaRPr lang="en-SE"/>
           </a:p>
@@ -1825,7 +1830,7 @@
           <a:p>
             <a:fld id="{076813AA-E60F-46CB-AF35-4E9FD021AE48}" type="datetimeFigureOut">
               <a:rPr lang="en-SE" smtClean="0"/>
-              <a:t>2024-10-26</a:t>
+              <a:t>2024-10-27</a:t>
             </a:fld>
             <a:endParaRPr lang="en-SE"/>
           </a:p>
@@ -2102,7 +2107,7 @@
           <a:p>
             <a:fld id="{076813AA-E60F-46CB-AF35-4E9FD021AE48}" type="datetimeFigureOut">
               <a:rPr lang="en-SE" smtClean="0"/>
-              <a:t>2024-10-26</a:t>
+              <a:t>2024-10-27</a:t>
             </a:fld>
             <a:endParaRPr lang="en-SE"/>
           </a:p>
@@ -2359,7 +2364,7 @@
           <a:p>
             <a:fld id="{076813AA-E60F-46CB-AF35-4E9FD021AE48}" type="datetimeFigureOut">
               <a:rPr lang="en-SE" smtClean="0"/>
-              <a:t>2024-10-26</a:t>
+              <a:t>2024-10-27</a:t>
             </a:fld>
             <a:endParaRPr lang="en-SE"/>
           </a:p>
@@ -2572,7 +2577,7 @@
           <a:p>
             <a:fld id="{076813AA-E60F-46CB-AF35-4E9FD021AE48}" type="datetimeFigureOut">
               <a:rPr lang="en-SE" smtClean="0"/>
-              <a:t>2024-10-26</a:t>
+              <a:t>2024-10-27</a:t>
             </a:fld>
             <a:endParaRPr lang="en-SE"/>
           </a:p>
@@ -5553,42 +5558,6 @@
               </a:solidFill>
               <a:effectLst/>
             </a:endParaRPr>
-          </a:p>
-        </p:txBody>
-      </p:sp>
-      <p:sp>
-        <p:nvSpPr>
-          <p:cNvPr id="5" name="TextBox 4">
-            <a:extLst>
-              <a:ext uri="{FF2B5EF4-FFF2-40B4-BE49-F238E27FC236}">
-                <a16:creationId xmlns:a16="http://schemas.microsoft.com/office/drawing/2014/main" id="{1B4F939B-82EE-4CA2-D7DD-81CEBD7C68B3}"/>
-              </a:ext>
-            </a:extLst>
-          </p:cNvPr>
-          <p:cNvSpPr txBox="1"/>
-          <p:nvPr/>
-        </p:nvSpPr>
-        <p:spPr>
-          <a:xfrm>
-            <a:off x="3048000" y="3244334"/>
-            <a:ext cx="6096000" cy="369332"/>
-          </a:xfrm>
-          <a:prstGeom prst="rect">
-            <a:avLst/>
-          </a:prstGeom>
-          <a:noFill/>
-        </p:spPr>
-        <p:txBody>
-          <a:bodyPr wrap="square">
-            <a:spAutoFit/>
-          </a:bodyPr>
-          <a:lstStyle/>
-          <a:p>
-            <a:r>
-              <a:rPr lang="sv-SE" dirty="0"/>
-              <a:t>Syfte och Fokus</a:t>
-            </a:r>
-            <a:endParaRPr lang="en-SE" dirty="0"/>
           </a:p>
         </p:txBody>
       </p:sp>

</xml_diff>